<commit_message>
[ Modify ] ppt 수정
</commit_message>
<xml_diff>
--- a/gitDoc/최종프로젝트발표.pptx
+++ b/gitDoc/최종프로젝트발표.pptx
@@ -266,7 +266,7 @@
           <a:p>
             <a:fld id="{50E751FA-C280-44BA-91F2-41E93B99FE79}" type="datetimeFigureOut">
               <a:rPr lang="ko-KR" altLang="en-US" smtClean="0"/>
-              <a:t>2020-10-05</a:t>
+              <a:t>2020-10-06</a:t>
             </a:fld>
             <a:endParaRPr lang="ko-KR" altLang="en-US"/>
           </a:p>
@@ -1636,7 +1636,7 @@
           <a:p>
             <a:fld id="{6ACC9BC3-C0B1-4D46-BEA7-E3B32E3B9052}" type="datetimeFigureOut">
               <a:rPr lang="ko-KR" altLang="en-US" smtClean="0"/>
-              <a:t>2020-10-05</a:t>
+              <a:t>2020-10-06</a:t>
             </a:fld>
             <a:endParaRPr lang="ko-KR" altLang="en-US"/>
           </a:p>
@@ -1804,7 +1804,7 @@
           <a:p>
             <a:fld id="{6ACC9BC3-C0B1-4D46-BEA7-E3B32E3B9052}" type="datetimeFigureOut">
               <a:rPr lang="ko-KR" altLang="en-US" smtClean="0"/>
-              <a:t>2020-10-05</a:t>
+              <a:t>2020-10-06</a:t>
             </a:fld>
             <a:endParaRPr lang="ko-KR" altLang="en-US"/>
           </a:p>
@@ -1982,7 +1982,7 @@
           <a:p>
             <a:fld id="{6ACC9BC3-C0B1-4D46-BEA7-E3B32E3B9052}" type="datetimeFigureOut">
               <a:rPr lang="ko-KR" altLang="en-US" smtClean="0"/>
-              <a:t>2020-10-05</a:t>
+              <a:t>2020-10-06</a:t>
             </a:fld>
             <a:endParaRPr lang="ko-KR" altLang="en-US"/>
           </a:p>
@@ -2150,7 +2150,7 @@
           <a:p>
             <a:fld id="{6ACC9BC3-C0B1-4D46-BEA7-E3B32E3B9052}" type="datetimeFigureOut">
               <a:rPr lang="ko-KR" altLang="en-US" smtClean="0"/>
-              <a:t>2020-10-05</a:t>
+              <a:t>2020-10-06</a:t>
             </a:fld>
             <a:endParaRPr lang="ko-KR" altLang="en-US"/>
           </a:p>
@@ -2395,7 +2395,7 @@
           <a:p>
             <a:fld id="{6ACC9BC3-C0B1-4D46-BEA7-E3B32E3B9052}" type="datetimeFigureOut">
               <a:rPr lang="ko-KR" altLang="en-US" smtClean="0"/>
-              <a:t>2020-10-05</a:t>
+              <a:t>2020-10-06</a:t>
             </a:fld>
             <a:endParaRPr lang="ko-KR" altLang="en-US"/>
           </a:p>
@@ -2680,7 +2680,7 @@
           <a:p>
             <a:fld id="{6ACC9BC3-C0B1-4D46-BEA7-E3B32E3B9052}" type="datetimeFigureOut">
               <a:rPr lang="ko-KR" altLang="en-US" smtClean="0"/>
-              <a:t>2020-10-05</a:t>
+              <a:t>2020-10-06</a:t>
             </a:fld>
             <a:endParaRPr lang="ko-KR" altLang="en-US"/>
           </a:p>
@@ -3099,7 +3099,7 @@
           <a:p>
             <a:fld id="{6ACC9BC3-C0B1-4D46-BEA7-E3B32E3B9052}" type="datetimeFigureOut">
               <a:rPr lang="ko-KR" altLang="en-US" smtClean="0"/>
-              <a:t>2020-10-05</a:t>
+              <a:t>2020-10-06</a:t>
             </a:fld>
             <a:endParaRPr lang="ko-KR" altLang="en-US"/>
           </a:p>
@@ -3216,7 +3216,7 @@
           <a:p>
             <a:fld id="{6ACC9BC3-C0B1-4D46-BEA7-E3B32E3B9052}" type="datetimeFigureOut">
               <a:rPr lang="ko-KR" altLang="en-US" smtClean="0"/>
-              <a:t>2020-10-05</a:t>
+              <a:t>2020-10-06</a:t>
             </a:fld>
             <a:endParaRPr lang="ko-KR" altLang="en-US"/>
           </a:p>
@@ -3311,7 +3311,7 @@
           <a:p>
             <a:fld id="{6ACC9BC3-C0B1-4D46-BEA7-E3B32E3B9052}" type="datetimeFigureOut">
               <a:rPr lang="ko-KR" altLang="en-US" smtClean="0"/>
-              <a:t>2020-10-05</a:t>
+              <a:t>2020-10-06</a:t>
             </a:fld>
             <a:endParaRPr lang="ko-KR" altLang="en-US"/>
           </a:p>
@@ -3586,7 +3586,7 @@
           <a:p>
             <a:fld id="{6ACC9BC3-C0B1-4D46-BEA7-E3B32E3B9052}" type="datetimeFigureOut">
               <a:rPr lang="ko-KR" altLang="en-US" smtClean="0"/>
-              <a:t>2020-10-05</a:t>
+              <a:t>2020-10-06</a:t>
             </a:fld>
             <a:endParaRPr lang="ko-KR" altLang="en-US"/>
           </a:p>
@@ -3841,7 +3841,7 @@
           <a:p>
             <a:fld id="{6ACC9BC3-C0B1-4D46-BEA7-E3B32E3B9052}" type="datetimeFigureOut">
               <a:rPr lang="ko-KR" altLang="en-US" smtClean="0"/>
-              <a:t>2020-10-05</a:t>
+              <a:t>2020-10-06</a:t>
             </a:fld>
             <a:endParaRPr lang="ko-KR" altLang="en-US"/>
           </a:p>
@@ -4052,7 +4052,7 @@
           <a:p>
             <a:fld id="{6ACC9BC3-C0B1-4D46-BEA7-E3B32E3B9052}" type="datetimeFigureOut">
               <a:rPr lang="ko-KR" altLang="en-US" smtClean="0"/>
-              <a:t>2020-10-05</a:t>
+              <a:t>2020-10-06</a:t>
             </a:fld>
             <a:endParaRPr lang="ko-KR" altLang="en-US"/>
           </a:p>
@@ -7402,6 +7402,114 @@
           <a:chExt cx="0" cy="0"/>
         </a:xfrm>
       </p:grpSpPr>
+      <p:sp>
+        <p:nvSpPr>
+          <p:cNvPr id="11" name="직사각형 10">
+            <a:extLst>
+              <a:ext uri="{FF2B5EF4-FFF2-40B4-BE49-F238E27FC236}">
+                <a16:creationId xmlns:a16="http://schemas.microsoft.com/office/drawing/2014/main" id="{FAEDCA8E-33AC-43A2-B8C4-6705E9E99598}"/>
+              </a:ext>
+            </a:extLst>
+          </p:cNvPr>
+          <p:cNvSpPr/>
+          <p:nvPr/>
+        </p:nvSpPr>
+        <p:spPr>
+          <a:xfrm>
+            <a:off x="4641772" y="5298665"/>
+            <a:ext cx="2020349" cy="340108"/>
+          </a:xfrm>
+          <a:prstGeom prst="rect">
+            <a:avLst/>
+          </a:prstGeom>
+          <a:solidFill>
+            <a:srgbClr val="009B57">
+              <a:alpha val="59000"/>
+            </a:srgbClr>
+          </a:solidFill>
+          <a:ln>
+            <a:noFill/>
+          </a:ln>
+        </p:spPr>
+        <p:style>
+          <a:lnRef idx="2">
+            <a:schemeClr val="accent1">
+              <a:shade val="50000"/>
+            </a:schemeClr>
+          </a:lnRef>
+          <a:fillRef idx="1">
+            <a:schemeClr val="accent1"/>
+          </a:fillRef>
+          <a:effectRef idx="0">
+            <a:schemeClr val="accent1"/>
+          </a:effectRef>
+          <a:fontRef idx="minor">
+            <a:schemeClr val="lt1"/>
+          </a:fontRef>
+        </p:style>
+        <p:txBody>
+          <a:bodyPr rtlCol="0" anchor="ctr"/>
+          <a:lstStyle/>
+          <a:p>
+            <a:pPr algn="ctr"/>
+            <a:endParaRPr lang="ko-KR" altLang="en-US" dirty="0"/>
+          </a:p>
+        </p:txBody>
+      </p:sp>
+      <p:sp>
+        <p:nvSpPr>
+          <p:cNvPr id="10" name="직사각형 9">
+            <a:extLst>
+              <a:ext uri="{FF2B5EF4-FFF2-40B4-BE49-F238E27FC236}">
+                <a16:creationId xmlns:a16="http://schemas.microsoft.com/office/drawing/2014/main" id="{1BBAF008-D8F2-4920-8F10-DE082373CA20}"/>
+              </a:ext>
+            </a:extLst>
+          </p:cNvPr>
+          <p:cNvSpPr/>
+          <p:nvPr/>
+        </p:nvSpPr>
+        <p:spPr>
+          <a:xfrm>
+            <a:off x="4641772" y="4796011"/>
+            <a:ext cx="2020349" cy="340108"/>
+          </a:xfrm>
+          <a:prstGeom prst="rect">
+            <a:avLst/>
+          </a:prstGeom>
+          <a:solidFill>
+            <a:srgbClr val="009B57">
+              <a:alpha val="59000"/>
+            </a:srgbClr>
+          </a:solidFill>
+          <a:ln>
+            <a:noFill/>
+          </a:ln>
+        </p:spPr>
+        <p:style>
+          <a:lnRef idx="2">
+            <a:schemeClr val="accent1">
+              <a:shade val="50000"/>
+            </a:schemeClr>
+          </a:lnRef>
+          <a:fillRef idx="1">
+            <a:schemeClr val="accent1"/>
+          </a:fillRef>
+          <a:effectRef idx="0">
+            <a:schemeClr val="accent1"/>
+          </a:effectRef>
+          <a:fontRef idx="minor">
+            <a:schemeClr val="lt1"/>
+          </a:fontRef>
+        </p:style>
+        <p:txBody>
+          <a:bodyPr rtlCol="0" anchor="ctr"/>
+          <a:lstStyle/>
+          <a:p>
+            <a:pPr algn="ctr"/>
+            <a:endParaRPr lang="ko-KR" altLang="en-US" dirty="0"/>
+          </a:p>
+        </p:txBody>
+      </p:sp>
       <p:grpSp>
         <p:nvGrpSpPr>
           <p:cNvPr id="2" name="그룹 1"/>
@@ -7645,10 +7753,10 @@
         </p:nvGrpSpPr>
         <p:grpSpPr>
           <a:xfrm>
-            <a:off x="4641775" y="1732050"/>
-            <a:ext cx="2091032" cy="3508653"/>
-            <a:chOff x="4801566" y="2173370"/>
-            <a:chExt cx="1760621" cy="2971425"/>
+            <a:off x="4623685" y="1116608"/>
+            <a:ext cx="2056520" cy="4616648"/>
+            <a:chOff x="4786336" y="2155418"/>
+            <a:chExt cx="1731563" cy="3909768"/>
           </a:xfrm>
         </p:grpSpPr>
         <p:sp>
@@ -7665,7 +7773,7 @@
           </p:nvSpPr>
           <p:spPr>
             <a:xfrm>
-              <a:off x="4801566" y="4830064"/>
+              <a:off x="4801565" y="4819223"/>
               <a:ext cx="1701107" cy="288032"/>
             </a:xfrm>
             <a:prstGeom prst="rect">
@@ -8001,8 +8109,8 @@
           </p:nvSpPr>
           <p:spPr>
             <a:xfrm>
-              <a:off x="4830624" y="2173370"/>
-              <a:ext cx="1731563" cy="2971425"/>
+              <a:off x="4786336" y="2155418"/>
+              <a:ext cx="1731563" cy="3909768"/>
             </a:xfrm>
             <a:prstGeom prst="rect">
               <a:avLst/>
@@ -8295,7 +8403,7 @@
                   <a:latin typeface="나눔스퀘어 Bold" panose="020B0600000101010101" pitchFamily="34" charset="-127"/>
                   <a:ea typeface="나눔스퀘어 Bold" panose="020B0600000101010101" pitchFamily="34" charset="-127"/>
                 </a:rPr>
-                <a:t>4. </a:t>
+                <a:t>4. DB </a:t>
               </a:r>
               <a:r>
                 <a:rPr lang="ko-KR" altLang="en-US" dirty="0">
@@ -8312,7 +8420,7 @@
                   <a:latin typeface="나눔스퀘어 Bold" panose="020B0600000101010101" pitchFamily="34" charset="-127"/>
                   <a:ea typeface="나눔스퀘어 Bold" panose="020B0600000101010101" pitchFamily="34" charset="-127"/>
                 </a:rPr>
-                <a:t>하나방의 강점 </a:t>
+                <a:t>설계도</a:t>
               </a:r>
               <a:endParaRPr lang="en-US" altLang="ko-KR" dirty="0">
                 <a:ln>
@@ -8397,7 +8505,7 @@
                   <a:latin typeface="나눔스퀘어 Bold" panose="020B0600000101010101" pitchFamily="34" charset="-127"/>
                   <a:ea typeface="나눔스퀘어 Bold" panose="020B0600000101010101" pitchFamily="34" charset="-127"/>
                 </a:rPr>
-                <a:t>시나리오</a:t>
+                <a:t>하나방의 강점</a:t>
               </a:r>
               <a:endParaRPr lang="en-US" altLang="ko-KR" dirty="0">
                 <a:ln>
@@ -8479,7 +8587,7 @@
                   <a:latin typeface="나눔스퀘어 Bold" panose="020B0600000101010101" pitchFamily="34" charset="-127"/>
                   <a:ea typeface="나눔스퀘어 Bold" panose="020B0600000101010101" pitchFamily="34" charset="-127"/>
                 </a:rPr>
-                <a:t>부가 기능     </a:t>
+                <a:t>시나리오 및 기능</a:t>
               </a:r>
               <a:endParaRPr lang="en-US" altLang="ko-KR" dirty="0">
                 <a:ln>
@@ -8498,7 +8606,7 @@
             </a:p>
             <a:p>
               <a:r>
-                <a:rPr lang="ko-KR" altLang="en-US" sz="1400" dirty="0">
+                <a:rPr lang="ko-KR" altLang="en-US" sz="1500" dirty="0">
                   <a:ln>
                     <a:solidFill>
                       <a:schemeClr val="accent1">
@@ -8514,7 +8622,7 @@
                 </a:rPr>
                 <a:t>        </a:t>
               </a:r>
-              <a:endParaRPr lang="en-US" altLang="ko-KR" sz="1400" dirty="0">
+              <a:endParaRPr lang="en-US" altLang="ko-KR" sz="1500" dirty="0">
                 <a:ln>
                   <a:solidFill>
                     <a:schemeClr val="accent1">
@@ -8545,7 +8653,7 @@
                   <a:latin typeface="나눔스퀘어 Bold" panose="020B0600000101010101" pitchFamily="34" charset="-127"/>
                   <a:ea typeface="나눔스퀘어 Bold" panose="020B0600000101010101" pitchFamily="34" charset="-127"/>
                 </a:rPr>
-                <a:t>7. DB </a:t>
+                <a:t>7. </a:t>
               </a:r>
               <a:r>
                 <a:rPr lang="ko-KR" altLang="en-US" dirty="0">
@@ -8562,7 +8670,156 @@
                   <a:latin typeface="나눔스퀘어 Bold" panose="020B0600000101010101" pitchFamily="34" charset="-127"/>
                   <a:ea typeface="나눔스퀘어 Bold" panose="020B0600000101010101" pitchFamily="34" charset="-127"/>
                 </a:rPr>
-                <a:t>설계도          </a:t>
+                <a:t>부가기능</a:t>
+              </a:r>
+              <a:endParaRPr lang="en-US" altLang="ko-KR" dirty="0">
+                <a:ln>
+                  <a:solidFill>
+                    <a:schemeClr val="accent1">
+                      <a:alpha val="0"/>
+                    </a:schemeClr>
+                  </a:solidFill>
+                </a:ln>
+                <a:solidFill>
+                  <a:schemeClr val="bg1"/>
+                </a:solidFill>
+                <a:latin typeface="나눔스퀘어 Bold" panose="020B0600000101010101" pitchFamily="34" charset="-127"/>
+                <a:ea typeface="나눔스퀘어 Bold" panose="020B0600000101010101" pitchFamily="34" charset="-127"/>
+              </a:endParaRPr>
+            </a:p>
+            <a:p>
+              <a:r>
+                <a:rPr lang="ko-KR" altLang="en-US" sz="1800" dirty="0">
+                  <a:ln>
+                    <a:solidFill>
+                      <a:schemeClr val="accent1">
+                        <a:alpha val="0"/>
+                      </a:schemeClr>
+                    </a:solidFill>
+                  </a:ln>
+                  <a:solidFill>
+                    <a:schemeClr val="bg1"/>
+                  </a:solidFill>
+                  <a:latin typeface="나눔스퀘어 Bold" panose="020B0600000101010101" pitchFamily="34" charset="-127"/>
+                  <a:ea typeface="나눔스퀘어 Bold" panose="020B0600000101010101" pitchFamily="34" charset="-127"/>
+                </a:rPr>
+                <a:t> </a:t>
+              </a:r>
+              <a:endParaRPr lang="en-US" altLang="ko-KR" sz="1800" dirty="0">
+                <a:ln>
+                  <a:solidFill>
+                    <a:schemeClr val="accent1">
+                      <a:alpha val="0"/>
+                    </a:schemeClr>
+                  </a:solidFill>
+                </a:ln>
+                <a:solidFill>
+                  <a:schemeClr val="bg1"/>
+                </a:solidFill>
+                <a:latin typeface="나눔스퀘어 Bold" panose="020B0600000101010101" pitchFamily="34" charset="-127"/>
+                <a:ea typeface="나눔스퀘어 Bold" panose="020B0600000101010101" pitchFamily="34" charset="-127"/>
+              </a:endParaRPr>
+            </a:p>
+            <a:p>
+              <a:r>
+                <a:rPr lang="en-US" altLang="ko-KR" dirty="0">
+                  <a:ln>
+                    <a:solidFill>
+                      <a:schemeClr val="accent1">
+                        <a:alpha val="0"/>
+                      </a:schemeClr>
+                    </a:solidFill>
+                  </a:ln>
+                  <a:solidFill>
+                    <a:schemeClr val="bg1"/>
+                  </a:solidFill>
+                  <a:latin typeface="나눔스퀘어 Bold" panose="020B0600000101010101" pitchFamily="34" charset="-127"/>
+                  <a:ea typeface="나눔스퀘어 Bold" panose="020B0600000101010101" pitchFamily="34" charset="-127"/>
+                </a:rPr>
+                <a:t>8. </a:t>
+              </a:r>
+              <a:r>
+                <a:rPr lang="ko-KR" altLang="en-US" dirty="0">
+                  <a:ln>
+                    <a:solidFill>
+                      <a:schemeClr val="accent1">
+                        <a:alpha val="0"/>
+                      </a:schemeClr>
+                    </a:solidFill>
+                  </a:ln>
+                  <a:solidFill>
+                    <a:schemeClr val="bg1"/>
+                  </a:solidFill>
+                  <a:latin typeface="나눔스퀘어 Bold" panose="020B0600000101010101" pitchFamily="34" charset="-127"/>
+                  <a:ea typeface="나눔스퀘어 Bold" panose="020B0600000101010101" pitchFamily="34" charset="-127"/>
+                </a:rPr>
+                <a:t>시연</a:t>
+              </a:r>
+              <a:endParaRPr lang="en-US" altLang="ko-KR" dirty="0">
+                <a:ln>
+                  <a:solidFill>
+                    <a:schemeClr val="accent1">
+                      <a:alpha val="0"/>
+                    </a:schemeClr>
+                  </a:solidFill>
+                </a:ln>
+                <a:solidFill>
+                  <a:schemeClr val="bg1"/>
+                </a:solidFill>
+                <a:latin typeface="나눔스퀘어 Bold" panose="020B0600000101010101" pitchFamily="34" charset="-127"/>
+                <a:ea typeface="나눔스퀘어 Bold" panose="020B0600000101010101" pitchFamily="34" charset="-127"/>
+              </a:endParaRPr>
+            </a:p>
+            <a:p>
+              <a:endParaRPr lang="en-US" altLang="ko-KR" sz="1500" dirty="0">
+                <a:ln>
+                  <a:solidFill>
+                    <a:schemeClr val="accent1">
+                      <a:alpha val="0"/>
+                    </a:schemeClr>
+                  </a:solidFill>
+                </a:ln>
+                <a:solidFill>
+                  <a:schemeClr val="bg1"/>
+                </a:solidFill>
+                <a:latin typeface="나눔스퀘어 Bold" panose="020B0600000101010101" pitchFamily="34" charset="-127"/>
+                <a:ea typeface="나눔스퀘어 Bold" panose="020B0600000101010101" pitchFamily="34" charset="-127"/>
+              </a:endParaRPr>
+            </a:p>
+            <a:p>
+              <a:r>
+                <a:rPr lang="en-US" altLang="ko-KR" dirty="0">
+                  <a:ln>
+                    <a:solidFill>
+                      <a:schemeClr val="accent1">
+                        <a:alpha val="0"/>
+                      </a:schemeClr>
+                    </a:solidFill>
+                  </a:ln>
+                  <a:solidFill>
+                    <a:schemeClr val="bg1"/>
+                  </a:solidFill>
+                  <a:latin typeface="나눔스퀘어 Bold" panose="020B0600000101010101" pitchFamily="34" charset="-127"/>
+                  <a:ea typeface="나눔스퀘어 Bold" panose="020B0600000101010101" pitchFamily="34" charset="-127"/>
+                </a:rPr>
+                <a:t>9. </a:t>
+              </a:r>
+              <a:r>
+                <a:rPr lang="ko-KR" altLang="en-US" dirty="0">
+                  <a:ln>
+                    <a:solidFill>
+                      <a:schemeClr val="accent1">
+                        <a:alpha val="0"/>
+                      </a:schemeClr>
+                    </a:solidFill>
+                  </a:ln>
+                  <a:solidFill>
+                    <a:schemeClr val="bg1"/>
+                  </a:solidFill>
+                  <a:latin typeface="나눔스퀘어 Bold" panose="020B0600000101010101" pitchFamily="34" charset="-127"/>
+                  <a:ea typeface="나눔스퀘어 Bold" panose="020B0600000101010101" pitchFamily="34" charset="-127"/>
+                </a:rPr>
+                <a:t>보완점</a:t>
               </a:r>
               <a:endParaRPr lang="en-US" altLang="ko-KR" dirty="0">
                 <a:ln>

</xml_diff>